<commit_message>
add ppt absolusi, malam natal dan natal
</commit_message>
<xml_diff>
--- a/2020 12 tanggal 19 - 20/Slide Misa Bahasa Sunda.pptx
+++ b/2020 12 tanggal 19 - 20/Slide Misa Bahasa Sunda.pptx
@@ -9,7 +9,7 @@
     <p:sldId id="260" r:id="rId3"/>
     <p:sldId id="392" r:id="rId4"/>
     <p:sldId id="393" r:id="rId5"/>
-    <p:sldId id="394" r:id="rId6"/>
+    <p:sldId id="395" r:id="rId6"/>
     <p:sldId id="266" r:id="rId7"/>
     <p:sldId id="267" r:id="rId8"/>
     <p:sldId id="268" r:id="rId9"/>
@@ -173,7 +173,7 @@
             <p14:sldId id="260"/>
             <p14:sldId id="392"/>
             <p14:sldId id="393"/>
-            <p14:sldId id="394"/>
+            <p14:sldId id="395"/>
           </p14:sldIdLst>
         </p14:section>
         <p14:section name="Laku Tobat" id="{BE140D94-2FB0-46F8-90B7-258ED6C8D341}">
@@ -476,7 +476,7 @@
             <a:fld id="{B61BEF0D-F0BB-DE4B-95CE-6DB70DBA9567}" type="datetimeFigureOut">
               <a:rPr lang="en-US" smtClean="0"/>
               <a:pPr/>
-              <a:t>12/19/2020</a:t>
+              <a:t>12/20/2020</a:t>
             </a:fld>
             <a:endParaRPr lang="en-US" dirty="0"/>
           </a:p>
@@ -753,7 +753,7 @@
             <a:fld id="{B61BEF0D-F0BB-DE4B-95CE-6DB70DBA9567}" type="datetimeFigureOut">
               <a:rPr lang="en-US" smtClean="0"/>
               <a:pPr/>
-              <a:t>12/19/2020</a:t>
+              <a:t>12/20/2020</a:t>
             </a:fld>
             <a:endParaRPr lang="en-US" dirty="0"/>
           </a:p>
@@ -949,7 +949,7 @@
             <a:fld id="{B61BEF0D-F0BB-DE4B-95CE-6DB70DBA9567}" type="datetimeFigureOut">
               <a:rPr lang="en-US" smtClean="0"/>
               <a:pPr/>
-              <a:t>12/19/2020</a:t>
+              <a:t>12/20/2020</a:t>
             </a:fld>
             <a:endParaRPr lang="en-US" dirty="0"/>
           </a:p>
@@ -1222,7 +1222,7 @@
             <a:fld id="{B61BEF0D-F0BB-DE4B-95CE-6DB70DBA9567}" type="datetimeFigureOut">
               <a:rPr lang="en-US" smtClean="0"/>
               <a:pPr/>
-              <a:t>12/19/2020</a:t>
+              <a:t>12/20/2020</a:t>
             </a:fld>
             <a:endParaRPr lang="en-US" dirty="0"/>
           </a:p>
@@ -1551,7 +1551,7 @@
             <a:fld id="{B61BEF0D-F0BB-DE4B-95CE-6DB70DBA9567}" type="datetimeFigureOut">
               <a:rPr lang="en-US" smtClean="0"/>
               <a:pPr/>
-              <a:t>12/19/2020</a:t>
+              <a:t>12/20/2020</a:t>
             </a:fld>
             <a:endParaRPr lang="en-US" dirty="0"/>
           </a:p>
@@ -2172,7 +2172,7 @@
             <a:fld id="{B61BEF0D-F0BB-DE4B-95CE-6DB70DBA9567}" type="datetimeFigureOut">
               <a:rPr lang="en-US" smtClean="0"/>
               <a:pPr/>
-              <a:t>12/19/2020</a:t>
+              <a:t>12/20/2020</a:t>
             </a:fld>
             <a:endParaRPr lang="en-US" dirty="0"/>
           </a:p>
@@ -3021,7 +3021,7 @@
             <a:fld id="{B61BEF0D-F0BB-DE4B-95CE-6DB70DBA9567}" type="datetimeFigureOut">
               <a:rPr lang="en-US" smtClean="0"/>
               <a:pPr/>
-              <a:t>12/19/2020</a:t>
+              <a:t>12/20/2020</a:t>
             </a:fld>
             <a:endParaRPr lang="en-US" dirty="0"/>
           </a:p>
@@ -3192,7 +3192,7 @@
           <a:p>
             <a:fld id="{55C6B4A9-1611-4792-9094-5F34BCA07E0B}" type="datetimeFigureOut">
               <a:rPr lang="en-US" smtClean="0"/>
-              <a:t>12/19/2020</a:t>
+              <a:t>12/20/2020</a:t>
             </a:fld>
             <a:endParaRPr lang="en-US" dirty="0"/>
           </a:p>
@@ -3373,7 +3373,7 @@
             <a:fld id="{B61BEF0D-F0BB-DE4B-95CE-6DB70DBA9567}" type="datetimeFigureOut">
               <a:rPr lang="en-US" smtClean="0"/>
               <a:pPr/>
-              <a:t>12/19/2020</a:t>
+              <a:t>12/20/2020</a:t>
             </a:fld>
             <a:endParaRPr lang="en-US" dirty="0"/>
           </a:p>
@@ -3545,7 +3545,7 @@
             <a:fld id="{B61BEF0D-F0BB-DE4B-95CE-6DB70DBA9567}" type="datetimeFigureOut">
               <a:rPr lang="en-US" smtClean="0"/>
               <a:pPr/>
-              <a:t>12/19/2020</a:t>
+              <a:t>12/20/2020</a:t>
             </a:fld>
             <a:endParaRPr lang="en-US" dirty="0"/>
           </a:p>
@@ -3794,7 +3794,7 @@
             <a:fld id="{B61BEF0D-F0BB-DE4B-95CE-6DB70DBA9567}" type="datetimeFigureOut">
               <a:rPr lang="en-US" smtClean="0"/>
               <a:pPr/>
-              <a:t>12/19/2020</a:t>
+              <a:t>12/20/2020</a:t>
             </a:fld>
             <a:endParaRPr lang="en-US" dirty="0"/>
           </a:p>
@@ -4087,7 +4087,7 @@
           <a:p>
             <a:fld id="{EB712588-04B1-427B-82EE-E8DB90309F08}" type="datetimeFigureOut">
               <a:rPr lang="en-US" smtClean="0"/>
-              <a:t>12/19/2020</a:t>
+              <a:t>12/20/2020</a:t>
             </a:fld>
             <a:endParaRPr lang="en-US" dirty="0"/>
           </a:p>
@@ -4532,7 +4532,7 @@
             <a:fld id="{B61BEF0D-F0BB-DE4B-95CE-6DB70DBA9567}" type="datetimeFigureOut">
               <a:rPr lang="en-US" smtClean="0"/>
               <a:pPr/>
-              <a:t>12/19/2020</a:t>
+              <a:t>12/20/2020</a:t>
             </a:fld>
             <a:endParaRPr lang="en-US" dirty="0"/>
           </a:p>
@@ -4652,7 +4652,7 @@
             <a:fld id="{B61BEF0D-F0BB-DE4B-95CE-6DB70DBA9567}" type="datetimeFigureOut">
               <a:rPr lang="en-US" smtClean="0"/>
               <a:pPr/>
-              <a:t>12/19/2020</a:t>
+              <a:t>12/20/2020</a:t>
             </a:fld>
             <a:endParaRPr lang="en-US" dirty="0"/>
           </a:p>
@@ -4749,7 +4749,7 @@
             <a:fld id="{B61BEF0D-F0BB-DE4B-95CE-6DB70DBA9567}" type="datetimeFigureOut">
               <a:rPr lang="en-US" smtClean="0"/>
               <a:pPr/>
-              <a:t>12/19/2020</a:t>
+              <a:t>12/20/2020</a:t>
             </a:fld>
             <a:endParaRPr lang="en-US" dirty="0"/>
           </a:p>
@@ -5029,7 +5029,7 @@
           <a:p>
             <a:fld id="{42A54C80-263E-416B-A8E0-580EDEADCBDC}" type="datetimeFigureOut">
               <a:rPr lang="en-US" smtClean="0"/>
-              <a:t>12/19/2020</a:t>
+              <a:t>12/20/2020</a:t>
             </a:fld>
             <a:endParaRPr lang="en-US" dirty="0"/>
           </a:p>
@@ -5305,7 +5305,7 @@
             <a:fld id="{B61BEF0D-F0BB-DE4B-95CE-6DB70DBA9567}" type="datetimeFigureOut">
               <a:rPr lang="en-US" smtClean="0"/>
               <a:pPr/>
-              <a:t>12/19/2020</a:t>
+              <a:t>12/20/2020</a:t>
             </a:fld>
             <a:endParaRPr lang="en-US" dirty="0"/>
           </a:p>
@@ -5730,7 +5730,7 @@
             <a:fld id="{B61BEF0D-F0BB-DE4B-95CE-6DB70DBA9567}" type="datetimeFigureOut">
               <a:rPr lang="en-US" smtClean="0"/>
               <a:pPr/>
-              <a:t>12/19/2020</a:t>
+              <a:t>12/20/2020</a:t>
             </a:fld>
             <a:endParaRPr lang="en-US" dirty="0"/>
           </a:p>
@@ -6306,16 +6306,7 @@
                 </a:solidFill>
                 <a:latin typeface="Arial Black" panose="020B0A04020102020204" pitchFamily="34" charset="0"/>
               </a:rPr>
-              <a:t>ADVÈN </a:t>
-            </a:r>
-            <a:r>
-              <a:rPr lang="en-ID" sz="4800" dirty="0" smtClean="0">
-                <a:solidFill>
-                  <a:srgbClr val="FFFF00"/>
-                </a:solidFill>
-                <a:latin typeface="Arial Black" panose="020B0A04020102020204" pitchFamily="34" charset="0"/>
-              </a:rPr>
-              <a:t>IV</a:t>
+              <a:t>ADVÈN IV</a:t>
             </a:r>
             <a:endParaRPr lang="en-US" sz="4800" dirty="0">
               <a:solidFill>
@@ -6362,15 +6353,7 @@
                   <a:srgbClr val="FFFF00"/>
                 </a:solidFill>
               </a:rPr>
-              <a:t>, </a:t>
-            </a:r>
-            <a:r>
-              <a:rPr lang="en-ID" sz="4000" b="1" dirty="0" smtClean="0">
-                <a:solidFill>
-                  <a:srgbClr val="FFFF00"/>
-                </a:solidFill>
-              </a:rPr>
-              <a:t>19 </a:t>
+              <a:t>, 19 </a:t>
             </a:r>
             <a:r>
               <a:rPr lang="en-ID" sz="4000" b="1" dirty="0" err="1" smtClean="0">
@@ -6401,7 +6384,7 @@
           <p:cNvPr id="5" name="Picture 4">
             <a:extLst>
               <a:ext uri="{FF2B5EF4-FFF2-40B4-BE49-F238E27FC236}">
-                <a16:creationId xmlns="" xmlns:a16="http://schemas.microsoft.com/office/drawing/2014/main" id="{5DC82E51-4356-4594-A398-C30AF66213EF}"/>
+                <a16:creationId xmlns:a16="http://schemas.microsoft.com/office/drawing/2014/main" xmlns="" id="{5DC82E51-4356-4594-A398-C30AF66213EF}"/>
               </a:ext>
             </a:extLst>
           </p:cNvPr>
@@ -6676,7 +6659,25 @@
                 </a:solidFill>
                 <a:latin typeface="Arial Black" panose="020B0A04020102020204" pitchFamily="34" charset="0"/>
               </a:rPr>
-              <a:t>sareng ka parawargi sadaya, supados mangdoakeun abdi ka Pangeran, Allah urang sadaya.</a:t>
+              <a:t>sareng ka parawargi sadaya, supados mangdoakeun abdi ka </a:t>
+            </a:r>
+            <a:r>
+              <a:rPr lang="id-ID" sz="6000" b="1" dirty="0" smtClean="0">
+                <a:solidFill>
+                  <a:srgbClr val="FFFF00"/>
+                </a:solidFill>
+                <a:latin typeface="Arial Black" panose="020B0A04020102020204" pitchFamily="34" charset="0"/>
+              </a:rPr>
+              <a:t>Pangèran</a:t>
+            </a:r>
+            <a:r>
+              <a:rPr lang="id-ID" sz="6000" b="1" dirty="0">
+                <a:solidFill>
+                  <a:srgbClr val="FFFF00"/>
+                </a:solidFill>
+                <a:latin typeface="Arial Black" panose="020B0A04020102020204" pitchFamily="34" charset="0"/>
+              </a:rPr>
+              <a:t>, Allah urang sadaya.</a:t>
             </a:r>
             <a:endParaRPr lang="en-US" sz="6000" dirty="0">
               <a:solidFill>
@@ -8480,10 +8481,10 @@
                 <a:ea typeface="Calibri" panose="020F0502020204030204" pitchFamily="34" charset="0"/>
                 <a:cs typeface="Times New Roman" panose="02020603050405020304" pitchFamily="18" charset="0"/>
               </a:rPr>
-              <a:t>estu</a:t>
-            </a:r>
-            <a:r>
-              <a:rPr lang="en-ID" sz="4800" dirty="0">
+              <a:t>é</a:t>
+            </a:r>
+            <a:r>
+              <a:rPr lang="en-ID" sz="4800" dirty="0" err="1" smtClean="0">
                 <a:solidFill>
                   <a:srgbClr val="FFFF00"/>
                 </a:solidFill>
@@ -8491,7 +8492,40 @@
                 <a:ea typeface="Calibri" panose="020F0502020204030204" pitchFamily="34" charset="0"/>
                 <a:cs typeface="Times New Roman" panose="02020603050405020304" pitchFamily="18" charset="0"/>
               </a:rPr>
-              <a:t> manga </a:t>
+              <a:t>stu</a:t>
+            </a:r>
+            <a:r>
+              <a:rPr lang="en-ID" sz="4800" dirty="0" smtClean="0">
+                <a:solidFill>
+                  <a:srgbClr val="FFFF00"/>
+                </a:solidFill>
+                <a:latin typeface="Arial Black" panose="020B0A04020102020204" pitchFamily="34" charset="0"/>
+                <a:ea typeface="Calibri" panose="020F0502020204030204" pitchFamily="34" charset="0"/>
+                <a:cs typeface="Times New Roman" panose="02020603050405020304" pitchFamily="18" charset="0"/>
+              </a:rPr>
+              <a:t> </a:t>
+            </a:r>
+            <a:r>
+              <a:rPr lang="en-ID" sz="4800" dirty="0" err="1" smtClean="0">
+                <a:solidFill>
+                  <a:srgbClr val="FFFF00"/>
+                </a:solidFill>
+                <a:latin typeface="Arial Black" panose="020B0A04020102020204" pitchFamily="34" charset="0"/>
+                <a:ea typeface="Calibri" panose="020F0502020204030204" pitchFamily="34" charset="0"/>
+                <a:cs typeface="Times New Roman" panose="02020603050405020304" pitchFamily="18" charset="0"/>
+              </a:rPr>
+              <a:t>mangga</a:t>
+            </a:r>
+            <a:r>
+              <a:rPr lang="en-ID" sz="4800" dirty="0" smtClean="0">
+                <a:solidFill>
+                  <a:srgbClr val="FFFF00"/>
+                </a:solidFill>
+                <a:latin typeface="Arial Black" panose="020B0A04020102020204" pitchFamily="34" charset="0"/>
+                <a:ea typeface="Calibri" panose="020F0502020204030204" pitchFamily="34" charset="0"/>
+                <a:cs typeface="Times New Roman" panose="02020603050405020304" pitchFamily="18" charset="0"/>
+              </a:rPr>
+              <a:t> </a:t>
             </a:r>
             <a:r>
               <a:rPr lang="en-ID" sz="4800" dirty="0" err="1">
@@ -8562,7 +8596,7 @@
               <a:t> </a:t>
             </a:r>
             <a:r>
-              <a:rPr lang="en-ID" sz="4800" dirty="0" err="1">
+              <a:rPr lang="en-ID" sz="4800" dirty="0" err="1" smtClean="0">
                 <a:solidFill>
                   <a:srgbClr val="FFFF00"/>
                 </a:solidFill>
@@ -8570,7 +8604,7 @@
                 <a:ea typeface="Calibri" panose="020F0502020204030204" pitchFamily="34" charset="0"/>
                 <a:cs typeface="Times New Roman" panose="02020603050405020304" pitchFamily="18" charset="0"/>
               </a:rPr>
-              <a:t>keu</a:t>
+              <a:t>keur</a:t>
             </a:r>
             <a:r>
               <a:rPr lang="en-ID" sz="4800" dirty="0">
@@ -8584,7 +8618,7 @@
               <a:t> </a:t>
             </a:r>
             <a:r>
-              <a:rPr lang="en-ID" sz="4800" dirty="0" err="1">
+              <a:rPr lang="en-ID" sz="4800" dirty="0" err="1" smtClean="0">
                 <a:solidFill>
                   <a:srgbClr val="FFFF00"/>
                 </a:solidFill>
@@ -8592,7 +8626,29 @@
                 <a:ea typeface="Calibri" panose="020F0502020204030204" pitchFamily="34" charset="0"/>
                 <a:cs typeface="Times New Roman" panose="02020603050405020304" pitchFamily="18" charset="0"/>
               </a:rPr>
-              <a:t>poek</a:t>
+              <a:t>po</a:t>
+            </a:r>
+            <a:r>
+              <a:rPr lang="en-ID" sz="4800" dirty="0" err="1">
+                <a:solidFill>
+                  <a:srgbClr val="FFFF00"/>
+                </a:solidFill>
+                <a:latin typeface="Arial Black" panose="020B0A04020102020204" pitchFamily="34" charset="0"/>
+                <a:ea typeface="Calibri" panose="020F0502020204030204" pitchFamily="34" charset="0"/>
+                <a:cs typeface="Times New Roman" panose="02020603050405020304" pitchFamily="18" charset="0"/>
+              </a:rPr>
+              <a:t>é</a:t>
+            </a:r>
+            <a:r>
+              <a:rPr lang="en-ID" sz="4800" dirty="0" err="1" smtClean="0">
+                <a:solidFill>
+                  <a:srgbClr val="FFFF00"/>
+                </a:solidFill>
+                <a:latin typeface="Arial Black" panose="020B0A04020102020204" pitchFamily="34" charset="0"/>
+                <a:ea typeface="Calibri" panose="020F0502020204030204" pitchFamily="34" charset="0"/>
+                <a:cs typeface="Times New Roman" panose="02020603050405020304" pitchFamily="18" charset="0"/>
+              </a:rPr>
+              <a:t>k</a:t>
             </a:r>
             <a:endParaRPr lang="en-ID" sz="4800" dirty="0">
               <a:solidFill>
@@ -8641,7 +8697,7 @@
               <a:t> nu </a:t>
             </a:r>
             <a:r>
-              <a:rPr lang="en-ID" sz="4800" dirty="0" err="1">
+              <a:rPr lang="en-ID" sz="4800" dirty="0" err="1" smtClean="0">
                 <a:solidFill>
                   <a:srgbClr val="FFFF00"/>
                 </a:solidFill>
@@ -8649,10 +8705,10 @@
                 <a:ea typeface="Calibri" panose="020F0502020204030204" pitchFamily="34" charset="0"/>
                 <a:cs typeface="Times New Roman" panose="02020603050405020304" pitchFamily="18" charset="0"/>
               </a:rPr>
-              <a:t>poek</a:t>
-            </a:r>
-            <a:r>
-              <a:rPr lang="en-ID" sz="4800" dirty="0">
+              <a:t>po</a:t>
+            </a:r>
+            <a:r>
+              <a:rPr lang="en-ID" sz="4800" dirty="0" err="1">
                 <a:solidFill>
                   <a:srgbClr val="FFFF00"/>
                 </a:solidFill>
@@ -8660,10 +8716,10 @@
                 <a:ea typeface="Calibri" panose="020F0502020204030204" pitchFamily="34" charset="0"/>
                 <a:cs typeface="Times New Roman" panose="02020603050405020304" pitchFamily="18" charset="0"/>
               </a:rPr>
-              <a:t> </a:t>
-            </a:r>
-            <a:r>
-              <a:rPr lang="en-ID" sz="4800" dirty="0" err="1">
+              <a:t>é</a:t>
+            </a:r>
+            <a:r>
+              <a:rPr lang="en-ID" sz="4800" dirty="0" err="1" smtClean="0">
                 <a:solidFill>
                   <a:srgbClr val="FFFF00"/>
                 </a:solidFill>
@@ -8671,7 +8727,51 @@
                 <a:ea typeface="Calibri" panose="020F0502020204030204" pitchFamily="34" charset="0"/>
                 <a:cs typeface="Times New Roman" panose="02020603050405020304" pitchFamily="18" charset="0"/>
               </a:rPr>
-              <a:t>mongkleng</a:t>
+              <a:t>k</a:t>
+            </a:r>
+            <a:r>
+              <a:rPr lang="en-ID" sz="4800" dirty="0" smtClean="0">
+                <a:solidFill>
+                  <a:srgbClr val="FFFF00"/>
+                </a:solidFill>
+                <a:latin typeface="Arial Black" panose="020B0A04020102020204" pitchFamily="34" charset="0"/>
+                <a:ea typeface="Calibri" panose="020F0502020204030204" pitchFamily="34" charset="0"/>
+                <a:cs typeface="Times New Roman" panose="02020603050405020304" pitchFamily="18" charset="0"/>
+              </a:rPr>
+              <a:t> </a:t>
+            </a:r>
+            <a:r>
+              <a:rPr lang="en-ID" sz="4800" dirty="0" err="1" smtClean="0">
+                <a:solidFill>
+                  <a:srgbClr val="FFFF00"/>
+                </a:solidFill>
+                <a:latin typeface="Arial Black" panose="020B0A04020102020204" pitchFamily="34" charset="0"/>
+                <a:ea typeface="Calibri" panose="020F0502020204030204" pitchFamily="34" charset="0"/>
+                <a:cs typeface="Times New Roman" panose="02020603050405020304" pitchFamily="18" charset="0"/>
+              </a:rPr>
+              <a:t>mongkl</a:t>
+            </a:r>
+            <a:r>
+              <a:rPr lang="en-ID" sz="4800" dirty="0" err="1">
+                <a:solidFill>
+                  <a:srgbClr val="FFFF00"/>
+                </a:solidFill>
+                <a:latin typeface="Arial Black" panose="020B0A04020102020204" pitchFamily="34" charset="0"/>
+                <a:ea typeface="Calibri" panose="020F0502020204030204" pitchFamily="34" charset="0"/>
+                <a:cs typeface="Times New Roman" panose="02020603050405020304" pitchFamily="18" charset="0"/>
+              </a:rPr>
+              <a:t>é</a:t>
+            </a:r>
+            <a:r>
+              <a:rPr lang="en-ID" sz="4800" dirty="0" err="1" smtClean="0">
+                <a:solidFill>
+                  <a:srgbClr val="FFFF00"/>
+                </a:solidFill>
+                <a:latin typeface="Arial Black" panose="020B0A04020102020204" pitchFamily="34" charset="0"/>
+                <a:ea typeface="Calibri" panose="020F0502020204030204" pitchFamily="34" charset="0"/>
+                <a:cs typeface="Times New Roman" panose="02020603050405020304" pitchFamily="18" charset="0"/>
+              </a:rPr>
+              <a:t>ng</a:t>
             </a:r>
             <a:endParaRPr lang="en-ID" sz="4800" dirty="0">
               <a:solidFill>
@@ -8709,7 +8809,7 @@
               <a:t> </a:t>
             </a:r>
             <a:r>
-              <a:rPr lang="en-ID" sz="4800" dirty="0" err="1">
+              <a:rPr lang="en-ID" sz="4800" dirty="0" err="1" smtClean="0">
                 <a:solidFill>
                   <a:srgbClr val="FFFF00"/>
                 </a:solidFill>
@@ -8717,10 +8817,32 @@
                 <a:ea typeface="Calibri" panose="020F0502020204030204" pitchFamily="34" charset="0"/>
                 <a:cs typeface="Times New Roman" panose="02020603050405020304" pitchFamily="18" charset="0"/>
               </a:rPr>
-              <a:t>teh</a:t>
-            </a:r>
-            <a:r>
-              <a:rPr lang="en-ID" sz="4800" dirty="0">
+              <a:t>t</a:t>
+            </a:r>
+            <a:r>
+              <a:rPr lang="en-ID" sz="4800" dirty="0" err="1">
+                <a:solidFill>
+                  <a:srgbClr val="FFFF00"/>
+                </a:solidFill>
+                <a:latin typeface="Arial Black" panose="020B0A04020102020204" pitchFamily="34" charset="0"/>
+                <a:ea typeface="Calibri" panose="020F0502020204030204" pitchFamily="34" charset="0"/>
+                <a:cs typeface="Times New Roman" panose="02020603050405020304" pitchFamily="18" charset="0"/>
+              </a:rPr>
+              <a:t>é</a:t>
+            </a:r>
+            <a:r>
+              <a:rPr lang="en-ID" sz="4800" dirty="0" err="1" smtClean="0">
+                <a:solidFill>
+                  <a:srgbClr val="FFFF00"/>
+                </a:solidFill>
+                <a:latin typeface="Arial Black" panose="020B0A04020102020204" pitchFamily="34" charset="0"/>
+                <a:ea typeface="Calibri" panose="020F0502020204030204" pitchFamily="34" charset="0"/>
+                <a:cs typeface="Times New Roman" panose="02020603050405020304" pitchFamily="18" charset="0"/>
+              </a:rPr>
+              <a:t>h</a:t>
+            </a:r>
+            <a:r>
+              <a:rPr lang="en-ID" sz="4800" dirty="0" smtClean="0">
                 <a:solidFill>
                   <a:srgbClr val="FFFF00"/>
                 </a:solidFill>
@@ -9278,8 +9400,8 @@
         </p:nvSpPr>
         <p:spPr>
           <a:xfrm>
-            <a:off x="649357" y="2067338"/>
-            <a:ext cx="10827026" cy="3008245"/>
+            <a:off x="649357" y="1643270"/>
+            <a:ext cx="10827026" cy="3432313"/>
           </a:xfrm>
         </p:spPr>
         <p:txBody>
@@ -9292,13 +9414,130 @@
               <a:buNone/>
             </a:pPr>
             <a:r>
+              <a:rPr lang="en-ID" sz="6000" dirty="0" err="1" smtClean="0">
+                <a:solidFill>
+                  <a:srgbClr val="FFFF00"/>
+                </a:solidFill>
+                <a:latin typeface="Arial Black" panose="020B0A04020102020204" pitchFamily="34" charset="0"/>
+              </a:rPr>
+              <a:t>Simabdi</a:t>
+            </a:r>
+            <a:r>
               <a:rPr lang="en-ID" sz="6000" dirty="0" smtClean="0">
                 <a:solidFill>
                   <a:srgbClr val="FFFF00"/>
                 </a:solidFill>
                 <a:latin typeface="Arial Black" panose="020B0A04020102020204" pitchFamily="34" charset="0"/>
               </a:rPr>
-              <a:t>?</a:t>
+              <a:t> </a:t>
+            </a:r>
+            <a:r>
+              <a:rPr lang="en-ID" sz="6000" dirty="0" err="1" smtClean="0">
+                <a:solidFill>
+                  <a:srgbClr val="FFFF00"/>
+                </a:solidFill>
+                <a:latin typeface="Arial Black" panose="020B0A04020102020204" pitchFamily="34" charset="0"/>
+              </a:rPr>
+              <a:t>sumeja</a:t>
+            </a:r>
+            <a:r>
+              <a:rPr lang="en-ID" sz="6000" dirty="0" smtClean="0">
+                <a:solidFill>
+                  <a:srgbClr val="FFFF00"/>
+                </a:solidFill>
+                <a:latin typeface="Arial Black" panose="020B0A04020102020204" pitchFamily="34" charset="0"/>
+              </a:rPr>
+              <a:t> </a:t>
+            </a:r>
+            <a:r>
+              <a:rPr lang="en-ID" sz="6000" dirty="0" err="1" smtClean="0">
+                <a:solidFill>
+                  <a:srgbClr val="FFFF00"/>
+                </a:solidFill>
+                <a:latin typeface="Arial Black" panose="020B0A04020102020204" pitchFamily="34" charset="0"/>
+              </a:rPr>
+              <a:t>ngawihkeun</a:t>
+            </a:r>
+            <a:r>
+              <a:rPr lang="en-ID" sz="6000" dirty="0" smtClean="0">
+                <a:solidFill>
+                  <a:srgbClr val="FFFF00"/>
+                </a:solidFill>
+                <a:latin typeface="Arial Black" panose="020B0A04020102020204" pitchFamily="34" charset="0"/>
+              </a:rPr>
+              <a:t> </a:t>
+            </a:r>
+            <a:r>
+              <a:rPr lang="en-ID" sz="6000" dirty="0" err="1" smtClean="0">
+                <a:solidFill>
+                  <a:srgbClr val="FFFF00"/>
+                </a:solidFill>
+                <a:latin typeface="Arial Black" panose="020B0A04020102020204" pitchFamily="34" charset="0"/>
+              </a:rPr>
+              <a:t>kaasih-satia</a:t>
+            </a:r>
+            <a:r>
+              <a:rPr lang="en-ID" sz="6000" dirty="0" smtClean="0">
+                <a:solidFill>
+                  <a:srgbClr val="FFFF00"/>
+                </a:solidFill>
+                <a:latin typeface="Arial Black" panose="020B0A04020102020204" pitchFamily="34" charset="0"/>
+              </a:rPr>
+              <a:t> </a:t>
+            </a:r>
+            <a:r>
+              <a:rPr lang="en-ID" sz="6000" dirty="0" err="1" smtClean="0">
+                <a:solidFill>
+                  <a:srgbClr val="FFFF00"/>
+                </a:solidFill>
+                <a:latin typeface="Arial Black" panose="020B0A04020102020204" pitchFamily="34" charset="0"/>
+              </a:rPr>
+              <a:t>Gusti</a:t>
+            </a:r>
+            <a:r>
+              <a:rPr lang="en-ID" sz="6000" dirty="0" smtClean="0">
+                <a:solidFill>
+                  <a:srgbClr val="FFFF00"/>
+                </a:solidFill>
+                <a:latin typeface="Arial Black" panose="020B0A04020102020204" pitchFamily="34" charset="0"/>
+              </a:rPr>
+              <a:t>, nun </a:t>
+            </a:r>
+            <a:r>
+              <a:rPr lang="en-ID" sz="6000" dirty="0" err="1" smtClean="0">
+                <a:solidFill>
+                  <a:srgbClr val="FFFF00"/>
+                </a:solidFill>
+                <a:latin typeface="Arial Black" panose="020B0A04020102020204" pitchFamily="34" charset="0"/>
+              </a:rPr>
+              <a:t>Pangèran</a:t>
+            </a:r>
+            <a:r>
+              <a:rPr lang="en-ID" sz="6000" dirty="0" smtClean="0">
+                <a:solidFill>
+                  <a:srgbClr val="FFFF00"/>
+                </a:solidFill>
+                <a:latin typeface="Arial Black" panose="020B0A04020102020204" pitchFamily="34" charset="0"/>
+              </a:rPr>
+              <a:t>, </a:t>
+            </a:r>
+            <a:r>
+              <a:rPr lang="en-ID" sz="6000" dirty="0" err="1" smtClean="0">
+                <a:solidFill>
+                  <a:srgbClr val="FFFF00"/>
+                </a:solidFill>
+                <a:latin typeface="Arial Black" panose="020B0A04020102020204" pitchFamily="34" charset="0"/>
+              </a:rPr>
+              <a:t>salalamina</a:t>
+            </a:r>
+            <a:r>
+              <a:rPr lang="en-ID" sz="6000" dirty="0" smtClean="0">
+                <a:solidFill>
+                  <a:srgbClr val="FFFF00"/>
+                </a:solidFill>
+                <a:latin typeface="Arial Black" panose="020B0A04020102020204" pitchFamily="34" charset="0"/>
+              </a:rPr>
+              <a:t>.</a:t>
             </a:r>
             <a:endParaRPr lang="en-US" sz="6000" dirty="0">
               <a:solidFill>
@@ -9728,7 +9967,27 @@
                 </a:solidFill>
                 <a:latin typeface="Arial Black" panose="020B0A04020102020204" pitchFamily="34" charset="0"/>
               </a:rPr>
-              <a:t> Santo </a:t>
+              <a:t> Lukas.</a:t>
+            </a:r>
+            <a:endParaRPr lang="en-ID" sz="6000" dirty="0" smtClean="0">
+              <a:solidFill>
+                <a:srgbClr val="FFFF00"/>
+              </a:solidFill>
+              <a:latin typeface="Arial Black" panose="020B0A04020102020204" pitchFamily="34" charset="0"/>
+            </a:endParaRPr>
+          </a:p>
+          <a:p>
+            <a:pPr marL="0" indent="0" algn="ctr">
+              <a:buNone/>
+            </a:pPr>
+            <a:r>
+              <a:rPr lang="en-ID" sz="6000" dirty="0" smtClean="0">
+                <a:solidFill>
+                  <a:srgbClr val="FFFF00"/>
+                </a:solidFill>
+                <a:latin typeface="Arial Black" panose="020B0A04020102020204" pitchFamily="34" charset="0"/>
+              </a:rPr>
+              <a:t>U : </a:t>
             </a:r>
             <a:r>
               <a:rPr lang="en-ID" sz="6000" dirty="0" err="1" smtClean="0">
@@ -9737,7 +9996,7 @@
                 </a:solidFill>
                 <a:latin typeface="Arial Black" panose="020B0A04020102020204" pitchFamily="34" charset="0"/>
               </a:rPr>
-              <a:t>Yohanes</a:t>
+              <a:t>Kamuliaan</a:t>
             </a:r>
             <a:r>
               <a:rPr lang="en-ID" sz="6000" dirty="0" smtClean="0">
@@ -9746,13 +10005,17 @@
                 </a:solidFill>
                 <a:latin typeface="Arial Black" panose="020B0A04020102020204" pitchFamily="34" charset="0"/>
               </a:rPr>
-              <a:t>.</a:t>
-            </a:r>
-          </a:p>
-          <a:p>
-            <a:pPr marL="0" indent="0" algn="ctr">
-              <a:buNone/>
-            </a:pPr>
+              <a:t> </a:t>
+            </a:r>
+            <a:r>
+              <a:rPr lang="en-ID" sz="6000" dirty="0" err="1" smtClean="0">
+                <a:solidFill>
+                  <a:srgbClr val="FFFF00"/>
+                </a:solidFill>
+                <a:latin typeface="Arial Black" panose="020B0A04020102020204" pitchFamily="34" charset="0"/>
+              </a:rPr>
+              <a:t>ka</a:t>
+            </a:r>
             <a:r>
               <a:rPr lang="en-ID" sz="6000" dirty="0" smtClean="0">
                 <a:solidFill>
@@ -9760,7 +10023,7 @@
                 </a:solidFill>
                 <a:latin typeface="Arial Black" panose="020B0A04020102020204" pitchFamily="34" charset="0"/>
               </a:rPr>
-              <a:t>U : </a:t>
+              <a:t> </a:t>
             </a:r>
             <a:r>
               <a:rPr lang="en-ID" sz="6000" dirty="0" err="1" smtClean="0">
@@ -9769,7 +10032,7 @@
                 </a:solidFill>
                 <a:latin typeface="Arial Black" panose="020B0A04020102020204" pitchFamily="34" charset="0"/>
               </a:rPr>
-              <a:t>Kamuliaan</a:t>
+              <a:t>Gusti</a:t>
             </a:r>
             <a:r>
               <a:rPr lang="en-ID" sz="6000" dirty="0" smtClean="0">
@@ -9778,7 +10041,7 @@
                 </a:solidFill>
                 <a:latin typeface="Arial Black" panose="020B0A04020102020204" pitchFamily="34" charset="0"/>
               </a:rPr>
-              <a:t> </a:t>
+              <a:t>, nun </a:t>
             </a:r>
             <a:r>
               <a:rPr lang="en-ID" sz="6000" dirty="0" err="1" smtClean="0">
@@ -9787,43 +10050,7 @@
                 </a:solidFill>
                 <a:latin typeface="Arial Black" panose="020B0A04020102020204" pitchFamily="34" charset="0"/>
               </a:rPr>
-              <a:t>ka</a:t>
-            </a:r>
-            <a:r>
-              <a:rPr lang="en-ID" sz="6000" dirty="0" smtClean="0">
-                <a:solidFill>
-                  <a:srgbClr val="FFFF00"/>
-                </a:solidFill>
-                <a:latin typeface="Arial Black" panose="020B0A04020102020204" pitchFamily="34" charset="0"/>
-              </a:rPr>
-              <a:t> </a:t>
-            </a:r>
-            <a:r>
-              <a:rPr lang="en-ID" sz="6000" dirty="0" err="1" smtClean="0">
-                <a:solidFill>
-                  <a:srgbClr val="FFFF00"/>
-                </a:solidFill>
-                <a:latin typeface="Arial Black" panose="020B0A04020102020204" pitchFamily="34" charset="0"/>
-              </a:rPr>
-              <a:t>Gusti</a:t>
-            </a:r>
-            <a:r>
-              <a:rPr lang="en-ID" sz="6000" dirty="0" smtClean="0">
-                <a:solidFill>
-                  <a:srgbClr val="FFFF00"/>
-                </a:solidFill>
-                <a:latin typeface="Arial Black" panose="020B0A04020102020204" pitchFamily="34" charset="0"/>
-              </a:rPr>
-              <a:t>, nun </a:t>
-            </a:r>
-            <a:r>
-              <a:rPr lang="en-ID" sz="6000" dirty="0" err="1" smtClean="0">
-                <a:solidFill>
-                  <a:srgbClr val="FFFF00"/>
-                </a:solidFill>
-                <a:latin typeface="Arial Black" panose="020B0A04020102020204" pitchFamily="34" charset="0"/>
-              </a:rPr>
-              <a:t>Pangeran</a:t>
+              <a:t>Pangèran</a:t>
             </a:r>
             <a:r>
               <a:rPr lang="en-ID" sz="6000" dirty="0" smtClean="0">
@@ -10094,7 +10321,25 @@
                 </a:solidFill>
                 <a:latin typeface="Arial Black" panose="020B0A04020102020204" pitchFamily="34" charset="0"/>
               </a:rPr>
-              <a:t>sareng ka Yesus Kristus, Putra-Na nu Tunggal, </a:t>
+              <a:t>sareng ka </a:t>
+            </a:r>
+            <a:r>
+              <a:rPr lang="id-ID" sz="6000" dirty="0" smtClean="0">
+                <a:solidFill>
+                  <a:srgbClr val="FFFF00"/>
+                </a:solidFill>
+                <a:latin typeface="Arial Black" panose="020B0A04020102020204" pitchFamily="34" charset="0"/>
+              </a:rPr>
+              <a:t>Yèsus </a:t>
+            </a:r>
+            <a:r>
+              <a:rPr lang="id-ID" sz="6000" dirty="0">
+                <a:solidFill>
+                  <a:srgbClr val="FFFF00"/>
+                </a:solidFill>
+                <a:latin typeface="Arial Black" panose="020B0A04020102020204" pitchFamily="34" charset="0"/>
+              </a:rPr>
+              <a:t>Kristus, Putra-Na nu Tunggal, </a:t>
             </a:r>
             <a:endParaRPr lang="en-US" sz="6000" dirty="0">
               <a:solidFill>
@@ -10470,10 +10715,10 @@
                 <a:ea typeface="Calibri" panose="020F0502020204030204" pitchFamily="34" charset="0"/>
                 <a:cs typeface="Times New Roman" panose="02020603050405020304" pitchFamily="18" charset="0"/>
               </a:rPr>
-              <a:t>Wireh</a:t>
-            </a:r>
-            <a:r>
-              <a:rPr lang="en-ID" sz="4800" dirty="0" smtClean="0">
+              <a:t>Wir</a:t>
+            </a:r>
+            <a:r>
+              <a:rPr lang="en-ID" sz="4800" dirty="0" err="1">
                 <a:solidFill>
                   <a:srgbClr val="FFFF00"/>
                 </a:solidFill>
@@ -10481,10 +10726,10 @@
                 <a:ea typeface="Calibri" panose="020F0502020204030204" pitchFamily="34" charset="0"/>
                 <a:cs typeface="Times New Roman" panose="02020603050405020304" pitchFamily="18" charset="0"/>
               </a:rPr>
-              <a:t> </a:t>
-            </a:r>
-            <a:r>
-              <a:rPr lang="en-ID" sz="4800" dirty="0" err="1">
+              <a:t>é</a:t>
+            </a:r>
+            <a:r>
+              <a:rPr lang="en-ID" sz="4800" dirty="0" err="1" smtClean="0">
                 <a:solidFill>
                   <a:srgbClr val="FFFF00"/>
                 </a:solidFill>
@@ -10492,10 +10737,10 @@
                 <a:ea typeface="Calibri" panose="020F0502020204030204" pitchFamily="34" charset="0"/>
                 <a:cs typeface="Times New Roman" panose="02020603050405020304" pitchFamily="18" charset="0"/>
               </a:rPr>
-              <a:t>caket</a:t>
-            </a:r>
-            <a:r>
-              <a:rPr lang="en-ID" sz="4800" dirty="0">
+              <a:t>h</a:t>
+            </a:r>
+            <a:r>
+              <a:rPr lang="en-ID" sz="4800" dirty="0" smtClean="0">
                 <a:solidFill>
                   <a:srgbClr val="FFFF00"/>
                 </a:solidFill>
@@ -10503,8 +10748,60 @@
                 <a:ea typeface="Calibri" panose="020F0502020204030204" pitchFamily="34" charset="0"/>
                 <a:cs typeface="Times New Roman" panose="02020603050405020304" pitchFamily="18" charset="0"/>
               </a:rPr>
-              <a:t> Immanuel</a:t>
-            </a:r>
+              <a:t> </a:t>
+            </a:r>
+            <a:r>
+              <a:rPr lang="en-ID" sz="4800" dirty="0" err="1">
+                <a:solidFill>
+                  <a:srgbClr val="FFFF00"/>
+                </a:solidFill>
+                <a:latin typeface="Arial Black" panose="020B0A04020102020204" pitchFamily="34" charset="0"/>
+                <a:ea typeface="Calibri" panose="020F0502020204030204" pitchFamily="34" charset="0"/>
+                <a:cs typeface="Times New Roman" panose="02020603050405020304" pitchFamily="18" charset="0"/>
+              </a:rPr>
+              <a:t>caket</a:t>
+            </a:r>
+            <a:r>
+              <a:rPr lang="en-ID" sz="4800" dirty="0">
+                <a:solidFill>
+                  <a:srgbClr val="FFFF00"/>
+                </a:solidFill>
+                <a:latin typeface="Arial Black" panose="020B0A04020102020204" pitchFamily="34" charset="0"/>
+                <a:ea typeface="Calibri" panose="020F0502020204030204" pitchFamily="34" charset="0"/>
+                <a:cs typeface="Times New Roman" panose="02020603050405020304" pitchFamily="18" charset="0"/>
+              </a:rPr>
+              <a:t> </a:t>
+            </a:r>
+            <a:r>
+              <a:rPr lang="en-ID" sz="4800" dirty="0" err="1">
+                <a:solidFill>
+                  <a:srgbClr val="FFFF00"/>
+                </a:solidFill>
+                <a:latin typeface="Arial Black" panose="020B0A04020102020204" pitchFamily="34" charset="0"/>
+                <a:ea typeface="Calibri" panose="020F0502020204030204" pitchFamily="34" charset="0"/>
+                <a:cs typeface="Times New Roman" panose="02020603050405020304" pitchFamily="18" charset="0"/>
+              </a:rPr>
+              <a:t>È</a:t>
+            </a:r>
+            <a:r>
+              <a:rPr lang="en-ID" sz="4800" dirty="0" err="1" smtClean="0">
+                <a:solidFill>
+                  <a:srgbClr val="FFFF00"/>
+                </a:solidFill>
+                <a:latin typeface="Arial Black" panose="020B0A04020102020204" pitchFamily="34" charset="0"/>
+                <a:ea typeface="Calibri" panose="020F0502020204030204" pitchFamily="34" charset="0"/>
+                <a:cs typeface="Times New Roman" panose="02020603050405020304" pitchFamily="18" charset="0"/>
+              </a:rPr>
+              <a:t>mmanuel</a:t>
+            </a:r>
+            <a:endParaRPr lang="en-ID" sz="4800" dirty="0">
+              <a:solidFill>
+                <a:srgbClr val="FFFF00"/>
+              </a:solidFill>
+              <a:latin typeface="Arial Black" panose="020B0A04020102020204" pitchFamily="34" charset="0"/>
+              <a:ea typeface="Calibri" panose="020F0502020204030204" pitchFamily="34" charset="0"/>
+              <a:cs typeface="Times New Roman" panose="02020603050405020304" pitchFamily="18" charset="0"/>
+            </a:endParaRPr>
           </a:p>
           <a:p>
             <a:pPr marL="0" indent="0">
@@ -12176,7 +12473,7 @@
               <a:t> </a:t>
             </a:r>
             <a:r>
-              <a:rPr lang="en-ID" sz="4800" dirty="0" err="1">
+              <a:rPr lang="en-ID" sz="4800" dirty="0" err="1" smtClean="0">
                 <a:solidFill>
                   <a:srgbClr val="FFFF00"/>
                 </a:solidFill>
@@ -12184,10 +12481,10 @@
                 <a:ea typeface="Calibri" panose="020F0502020204030204" pitchFamily="34" charset="0"/>
                 <a:cs typeface="Times New Roman" panose="02020603050405020304" pitchFamily="18" charset="0"/>
               </a:rPr>
-              <a:t>oge</a:t>
-            </a:r>
-            <a:r>
-              <a:rPr lang="en-ID" sz="4800" dirty="0">
+              <a:t>ogè</a:t>
+            </a:r>
+            <a:r>
+              <a:rPr lang="en-ID" sz="4800" dirty="0" smtClean="0">
                 <a:solidFill>
                   <a:srgbClr val="FFFF00"/>
                 </a:solidFill>
@@ -12233,7 +12530,7 @@
               <a:t>Duh </a:t>
             </a:r>
             <a:r>
-              <a:rPr lang="en-ID" sz="4800" dirty="0" err="1">
+              <a:rPr lang="en-ID" sz="4800" dirty="0" err="1" smtClean="0">
                 <a:solidFill>
                   <a:srgbClr val="FFFF00"/>
                 </a:solidFill>
@@ -12241,10 +12538,32 @@
                 <a:ea typeface="Calibri" panose="020F0502020204030204" pitchFamily="34" charset="0"/>
                 <a:cs typeface="Times New Roman" panose="02020603050405020304" pitchFamily="18" charset="0"/>
               </a:rPr>
-              <a:t>Yesus</a:t>
-            </a:r>
-            <a:r>
-              <a:rPr lang="en-ID" sz="4800" dirty="0">
+              <a:t>Y</a:t>
+            </a:r>
+            <a:r>
+              <a:rPr lang="en-ID" sz="4800" dirty="0" err="1">
+                <a:solidFill>
+                  <a:srgbClr val="FFFF00"/>
+                </a:solidFill>
+                <a:latin typeface="Arial Black" panose="020B0A04020102020204" pitchFamily="34" charset="0"/>
+                <a:ea typeface="Calibri" panose="020F0502020204030204" pitchFamily="34" charset="0"/>
+                <a:cs typeface="Times New Roman" panose="02020603050405020304" pitchFamily="18" charset="0"/>
+              </a:rPr>
+              <a:t>è</a:t>
+            </a:r>
+            <a:r>
+              <a:rPr lang="en-ID" sz="4800" dirty="0" err="1" smtClean="0">
+                <a:solidFill>
+                  <a:srgbClr val="FFFF00"/>
+                </a:solidFill>
+                <a:latin typeface="Arial Black" panose="020B0A04020102020204" pitchFamily="34" charset="0"/>
+                <a:ea typeface="Calibri" panose="020F0502020204030204" pitchFamily="34" charset="0"/>
+                <a:cs typeface="Times New Roman" panose="02020603050405020304" pitchFamily="18" charset="0"/>
+              </a:rPr>
+              <a:t>sus</a:t>
+            </a:r>
+            <a:r>
+              <a:rPr lang="en-ID" sz="4800" dirty="0" smtClean="0">
                 <a:solidFill>
                   <a:srgbClr val="FFFF00"/>
                 </a:solidFill>
@@ -12658,7 +12977,25 @@
                 </a:solidFill>
                 <a:latin typeface="Arial Black" panose="020B0A04020102020204" pitchFamily="34" charset="0"/>
               </a:rPr>
-              <a:t>Mangga urang miunjuk sukur ka Pangeran, Allah urang. </a:t>
+              <a:t>Mangga urang miunjuk sukur ka </a:t>
+            </a:r>
+            <a:r>
+              <a:rPr lang="id-ID" sz="6000" dirty="0" smtClean="0">
+                <a:solidFill>
+                  <a:srgbClr val="FFFF00"/>
+                </a:solidFill>
+                <a:latin typeface="Arial Black" panose="020B0A04020102020204" pitchFamily="34" charset="0"/>
+              </a:rPr>
+              <a:t>Pangèran</a:t>
+            </a:r>
+            <a:r>
+              <a:rPr lang="id-ID" sz="6000" dirty="0">
+                <a:solidFill>
+                  <a:srgbClr val="FFFF00"/>
+                </a:solidFill>
+                <a:latin typeface="Arial Black" panose="020B0A04020102020204" pitchFamily="34" charset="0"/>
+              </a:rPr>
+              <a:t>, Allah urang. </a:t>
             </a:r>
             <a:endParaRPr lang="en-US" sz="6000" dirty="0">
               <a:solidFill>
@@ -13736,7 +14073,25 @@
                 </a:solidFill>
                 <a:latin typeface="Arial Black" panose="020B0A04020102020204" pitchFamily="34" charset="0"/>
               </a:rPr>
-              <a:t>Nun Pangeran, abdi teu pantes,   	</a:t>
+              <a:t>Nun </a:t>
+            </a:r>
+            <a:r>
+              <a:rPr lang="id-ID" sz="6000" b="1" dirty="0" smtClean="0">
+                <a:solidFill>
+                  <a:srgbClr val="FFFF00"/>
+                </a:solidFill>
+                <a:latin typeface="Arial Black" panose="020B0A04020102020204" pitchFamily="34" charset="0"/>
+              </a:rPr>
+              <a:t>Pangèran</a:t>
+            </a:r>
+            <a:r>
+              <a:rPr lang="id-ID" sz="6000" b="1" dirty="0">
+                <a:solidFill>
+                  <a:srgbClr val="FFFF00"/>
+                </a:solidFill>
+                <a:latin typeface="Arial Black" panose="020B0A04020102020204" pitchFamily="34" charset="0"/>
+              </a:rPr>
+              <a:t>, abdi teu pantes,   	</a:t>
             </a:r>
             <a:endParaRPr lang="en-US" sz="6000" dirty="0">
               <a:solidFill>
@@ -14045,7 +14400,7 @@
                 <a:ea typeface="Calibri" panose="020F0502020204030204" pitchFamily="34" charset="0"/>
                 <a:cs typeface="Times New Roman" panose="02020603050405020304" pitchFamily="18" charset="0"/>
               </a:rPr>
-              <a:t>Wireh</a:t>
+              <a:t>Wiréh</a:t>
             </a:r>
             <a:r>
               <a:rPr lang="en-ID" sz="4800" dirty="0" smtClean="0">
@@ -14078,8 +14433,38 @@
                 <a:ea typeface="Calibri" panose="020F0502020204030204" pitchFamily="34" charset="0"/>
                 <a:cs typeface="Times New Roman" panose="02020603050405020304" pitchFamily="18" charset="0"/>
               </a:rPr>
-              <a:t> Immanuel</a:t>
-            </a:r>
+              <a:t> </a:t>
+            </a:r>
+            <a:r>
+              <a:rPr lang="en-ID" sz="4800" dirty="0" err="1">
+                <a:solidFill>
+                  <a:srgbClr val="FFFF00"/>
+                </a:solidFill>
+                <a:latin typeface="Arial Black" panose="020B0A04020102020204" pitchFamily="34" charset="0"/>
+                <a:ea typeface="Calibri" panose="020F0502020204030204" pitchFamily="34" charset="0"/>
+                <a:cs typeface="Times New Roman" panose="02020603050405020304" pitchFamily="18" charset="0"/>
+              </a:rPr>
+              <a:t>È</a:t>
+            </a:r>
+            <a:r>
+              <a:rPr lang="en-ID" sz="4800" dirty="0" err="1" smtClean="0">
+                <a:solidFill>
+                  <a:srgbClr val="FFFF00"/>
+                </a:solidFill>
+                <a:latin typeface="Arial Black" panose="020B0A04020102020204" pitchFamily="34" charset="0"/>
+                <a:ea typeface="Calibri" panose="020F0502020204030204" pitchFamily="34" charset="0"/>
+                <a:cs typeface="Times New Roman" panose="02020603050405020304" pitchFamily="18" charset="0"/>
+              </a:rPr>
+              <a:t>mmanuel</a:t>
+            </a:r>
+            <a:endParaRPr lang="en-ID" sz="4800" dirty="0">
+              <a:solidFill>
+                <a:srgbClr val="FFFF00"/>
+              </a:solidFill>
+              <a:latin typeface="Arial Black" panose="020B0A04020102020204" pitchFamily="34" charset="0"/>
+              <a:ea typeface="Calibri" panose="020F0502020204030204" pitchFamily="34" charset="0"/>
+              <a:cs typeface="Times New Roman" panose="02020603050405020304" pitchFamily="18" charset="0"/>
+            </a:endParaRPr>
           </a:p>
           <a:p>
             <a:pPr marL="0" indent="0">
@@ -14100,7 +14485,7 @@
     </p:spTree>
     <p:extLst>
       <p:ext uri="{BB962C8B-B14F-4D97-AF65-F5344CB8AC3E}">
-        <p14:creationId xmlns:p14="http://schemas.microsoft.com/office/powerpoint/2010/main" val="2761783314"/>
+        <p14:creationId xmlns:p14="http://schemas.microsoft.com/office/powerpoint/2010/main" val="352436969"/>
       </p:ext>
     </p:extLst>
   </p:cSld>
@@ -14660,16 +15045,16 @@
               <a:t> </a:t>
             </a:r>
             <a:r>
-              <a:rPr lang="en-US" sz="5400" b="1" dirty="0" err="1">
-                <a:solidFill>
-                  <a:srgbClr val="FFFF00"/>
-                </a:solidFill>
-                <a:latin typeface="Arial Black" panose="020B0A04020102020204" pitchFamily="34" charset="0"/>
-              </a:rPr>
-              <a:t>Yesus</a:t>
-            </a:r>
-            <a:r>
-              <a:rPr lang="en-US" sz="5400" b="1" dirty="0">
+              <a:rPr lang="en-US" sz="5400" b="1" dirty="0" err="1" smtClean="0">
+                <a:solidFill>
+                  <a:srgbClr val="FFFF00"/>
+                </a:solidFill>
+                <a:latin typeface="Arial Black" panose="020B0A04020102020204" pitchFamily="34" charset="0"/>
+              </a:rPr>
+              <a:t>Yèsus</a:t>
+            </a:r>
+            <a:r>
+              <a:rPr lang="en-US" sz="5400" b="1" dirty="0" smtClean="0">
                 <a:solidFill>
                   <a:srgbClr val="FFFF00"/>
                 </a:solidFill>
@@ -15075,16 +15460,16 @@
               <a:t>Kana </a:t>
             </a:r>
             <a:r>
-              <a:rPr lang="en-US" sz="5400" b="1" dirty="0" err="1">
-                <a:solidFill>
-                  <a:srgbClr val="FFFF00"/>
-                </a:solidFill>
-                <a:latin typeface="Arial Black" panose="020B0A04020102020204" pitchFamily="34" charset="0"/>
-              </a:rPr>
-              <a:t>karelaan</a:t>
-            </a:r>
-            <a:r>
-              <a:rPr lang="en-US" sz="5400" b="1" dirty="0">
+              <a:rPr lang="en-US" sz="5400" b="1" dirty="0" err="1" smtClean="0">
+                <a:solidFill>
+                  <a:srgbClr val="FFFF00"/>
+                </a:solidFill>
+                <a:latin typeface="Arial Black" panose="020B0A04020102020204" pitchFamily="34" charset="0"/>
+              </a:rPr>
+              <a:t>karèlaan</a:t>
+            </a:r>
+            <a:r>
+              <a:rPr lang="en-US" sz="5400" b="1" dirty="0" smtClean="0">
                 <a:solidFill>
                   <a:srgbClr val="FFFF00"/>
                 </a:solidFill>
@@ -16300,12 +16685,11 @@
                 <a:solidFill>
                   <a:srgbClr val="FFFF00"/>
                 </a:solidFill>
-                <a:effectLst/>
                 <a:latin typeface="Arial Black" panose="020B0A04020102020204" pitchFamily="34" charset="0"/>
                 <a:ea typeface="Calibri" panose="020F0502020204030204" pitchFamily="34" charset="0"/>
                 <a:cs typeface="Calibri" panose="020F0502020204030204" pitchFamily="34" charset="0"/>
               </a:rPr>
-              <a:t>rengse</a:t>
+              <a:t>rèngsè</a:t>
             </a:r>
             <a:endParaRPr lang="en-ID" sz="5400" b="1" dirty="0">
               <a:solidFill>

</xml_diff>